<commit_message>
remove 07c, fixed 07b, updated chart and docs.
</commit_message>
<xml_diff>
--- a/docs/presentation_slides.pptx
+++ b/docs/presentation_slides.pptx
@@ -134,7 +134,7 @@
   </p:defaultTextStyle>
   <p:extLst>
     <p:ext uri="{EFAFB233-063F-42B5-8137-9DF3F51BA10A}">
-      <p15:sldGuideLst xmlns:p15="http://schemas.microsoft.com/office/powerpoint/2012/main" xmlns="">
+      <p15:sldGuideLst xmlns="" xmlns:p15="http://schemas.microsoft.com/office/powerpoint/2012/main">
         <p15:guide id="1" orient="horz" pos="2160">
           <p15:clr>
             <a:srgbClr val="A4A3A4"/>
@@ -153,7 +153,7 @@
       </p15:sldGuideLst>
     </p:ext>
     <p:ext uri="{2D200454-40CA-4A62-9FC3-DE9A4176ACB9}">
-      <p15:notesGuideLst xmlns:p15="http://schemas.microsoft.com/office/powerpoint/2012/main" xmlns="">
+      <p15:notesGuideLst xmlns="" xmlns:p15="http://schemas.microsoft.com/office/powerpoint/2012/main">
         <p15:guide id="1" orient="horz" pos="2880">
           <p15:clr>
             <a:srgbClr val="A4A3A4"/>
@@ -253,7 +253,7 @@
             <a:fld id="{3CC3E3F2-CFAC-4B96-93BE-C4FCEE529209}" type="datetimeFigureOut">
               <a:rPr lang="en-US" smtClean="0"/>
               <a:pPr/>
-              <a:t>7/2/17</a:t>
+              <a:t>7/3/17</a:t>
             </a:fld>
             <a:endParaRPr lang="en-US"/>
           </a:p>
@@ -420,7 +420,7 @@
             <a:fld id="{4E7B5FCC-9116-4EB0-82EE-240C31BE59BE}" type="datetimeFigureOut">
               <a:rPr lang="en-US" smtClean="0"/>
               <a:pPr/>
-              <a:t>7/2/17</a:t>
+              <a:t>7/3/17</a:t>
             </a:fld>
             <a:endParaRPr lang="en-US"/>
           </a:p>
@@ -2988,7 +2988,7 @@
   </p:timing>
   <p:extLst mod="1">
     <p:ext uri="{DCECCB84-F9BA-43D5-87BE-67443E8EF086}">
-      <p15:sldGuideLst xmlns:p15="http://schemas.microsoft.com/office/powerpoint/2012/main" xmlns="">
+      <p15:sldGuideLst xmlns="" xmlns:p15="http://schemas.microsoft.com/office/powerpoint/2012/main">
         <p15:guide id="1" orient="horz" pos="2160" userDrawn="1">
           <p15:clr>
             <a:srgbClr val="FBAE40"/>
@@ -3984,7 +3984,7 @@
   </p:clrMapOvr>
   <p:extLst mod="1">
     <p:ext uri="{DCECCB84-F9BA-43D5-87BE-67443E8EF086}">
-      <p15:sldGuideLst xmlns:p15="http://schemas.microsoft.com/office/powerpoint/2012/main" xmlns="">
+      <p15:sldGuideLst xmlns="" xmlns:p15="http://schemas.microsoft.com/office/powerpoint/2012/main">
         <p15:guide id="1" orient="horz" pos="2160">
           <p15:clr>
             <a:srgbClr val="FBAE40"/>
@@ -4373,7 +4373,7 @@
   </p:clrMapOvr>
   <p:extLst mod="1">
     <p:ext uri="{DCECCB84-F9BA-43D5-87BE-67443E8EF086}">
-      <p15:sldGuideLst xmlns:p15="http://schemas.microsoft.com/office/powerpoint/2012/main" xmlns="">
+      <p15:sldGuideLst xmlns="" xmlns:p15="http://schemas.microsoft.com/office/powerpoint/2012/main">
         <p15:guide id="1" orient="horz" pos="2160">
           <p15:clr>
             <a:srgbClr val="FBAE40"/>
@@ -4762,7 +4762,7 @@
   </p:clrMapOvr>
   <p:extLst mod="1">
     <p:ext uri="{DCECCB84-F9BA-43D5-87BE-67443E8EF086}">
-      <p15:sldGuideLst xmlns:p15="http://schemas.microsoft.com/office/powerpoint/2012/main" xmlns="">
+      <p15:sldGuideLst xmlns="" xmlns:p15="http://schemas.microsoft.com/office/powerpoint/2012/main">
         <p15:guide id="1" orient="horz" pos="2160">
           <p15:clr>
             <a:srgbClr val="FBAE40"/>
@@ -4951,7 +4951,7 @@
   </p:clrMapOvr>
   <p:extLst mod="1">
     <p:ext uri="{DCECCB84-F9BA-43D5-87BE-67443E8EF086}">
-      <p15:sldGuideLst xmlns:p15="http://schemas.microsoft.com/office/powerpoint/2012/main" xmlns="">
+      <p15:sldGuideLst xmlns="" xmlns:p15="http://schemas.microsoft.com/office/powerpoint/2012/main">
         <p15:guide id="1" orient="horz" pos="2160">
           <p15:clr>
             <a:srgbClr val="FBAE40"/>
@@ -9286,8 +9286,8 @@
         </p:blipFill>
         <p:spPr>
           <a:xfrm>
-            <a:off x="5572168" y="1069247"/>
-            <a:ext cx="2506841" cy="3602062"/>
+            <a:off x="5476917" y="1206211"/>
+            <a:ext cx="3139440" cy="2895600"/>
           </a:xfrm>
           <a:prstGeom prst="rect">
             <a:avLst/>
@@ -11942,7 +11942,7 @@
   <a:extraClrSchemeLst/>
   <a:extLst>
     <a:ext uri="{05A4C25C-085E-4340-85A3-A5531E510DB2}">
-      <thm15:themeFamily xmlns:thm15="http://schemas.microsoft.com/office/thememl/2012/main" xmlns="" name="Office Theme" id="{62F939B6-93AF-4DB8-9C6B-D6C7DFDC589F}" vid="{4A3C46E8-61CC-4603-A589-7422A47A8E4A}"/>
+      <thm15:themeFamily xmlns="" xmlns:thm15="http://schemas.microsoft.com/office/thememl/2012/main" name="Office Theme" id="{62F939B6-93AF-4DB8-9C6B-D6C7DFDC589F}" vid="{4A3C46E8-61CC-4603-A589-7422A47A8E4A}"/>
     </a:ext>
   </a:extLst>
 </a:theme>
@@ -12203,7 +12203,7 @@
   <a:extraClrSchemeLst/>
   <a:extLst>
     <a:ext uri="{05A4C25C-085E-4340-85A3-A5531E510DB2}">
-      <thm15:themeFamily xmlns:thm15="http://schemas.microsoft.com/office/thememl/2012/main" xmlns="" name="Office Theme" id="{62F939B6-93AF-4DB8-9C6B-D6C7DFDC589F}" vid="{4A3C46E8-61CC-4603-A589-7422A47A8E4A}"/>
+      <thm15:themeFamily xmlns="" xmlns:thm15="http://schemas.microsoft.com/office/thememl/2012/main" name="Office Theme" id="{62F939B6-93AF-4DB8-9C6B-D6C7DFDC589F}" vid="{4A3C46E8-61CC-4603-A589-7422A47A8E4A}"/>
     </a:ext>
   </a:extLst>
 </a:theme>
@@ -12464,7 +12464,7 @@
   <a:extraClrSchemeLst/>
   <a:extLst>
     <a:ext uri="{05A4C25C-085E-4340-85A3-A5531E510DB2}">
-      <thm15:themeFamily xmlns:thm15="http://schemas.microsoft.com/office/thememl/2012/main" xmlns="" name="Office Theme" id="{62F939B6-93AF-4DB8-9C6B-D6C7DFDC589F}" vid="{4A3C46E8-61CC-4603-A589-7422A47A8E4A}"/>
+      <thm15:themeFamily xmlns="" xmlns:thm15="http://schemas.microsoft.com/office/thememl/2012/main" name="Office Theme" id="{62F939B6-93AF-4DB8-9C6B-D6C7DFDC589F}" vid="{4A3C46E8-61CC-4603-A589-7422A47A8E4A}"/>
     </a:ext>
   </a:extLst>
 </a:theme>

</xml_diff>